<commit_message>
added formula to make updating plots simpler and continued to clean up normalized data notebook
</commit_message>
<xml_diff>
--- a/Are Housing Prices Affected by Natural Disasters.pptx
+++ b/Are Housing Prices Affected by Natural Disasters.pptx
@@ -111,6 +111,11 @@
       </a:defRPr>
     </a:lvl9pPr>
   </p:defaultTextStyle>
+  <p:extLst>
+    <p:ext uri="{EFAFB233-063F-42B5-8137-9DF3F51BA10A}">
+      <p15:sldGuideLst xmlns:p15="http://schemas.microsoft.com/office/powerpoint/2012/main"/>
+    </p:ext>
+  </p:extLst>
 </p:presentation>
 </file>
 
@@ -261,7 +266,7 @@
           <a:p>
             <a:fld id="{5D63FE85-95CD-40DC-BFF3-BE62C2A435E5}" type="datetimeFigureOut">
               <a:rPr lang="en-US" smtClean="0"/>
-              <a:t>1/23/2019</a:t>
+              <a:t>1/24/2019</a:t>
             </a:fld>
             <a:endParaRPr lang="en-US" dirty="0"/>
           </a:p>
@@ -459,7 +464,7 @@
           <a:p>
             <a:fld id="{5D63FE85-95CD-40DC-BFF3-BE62C2A435E5}" type="datetimeFigureOut">
               <a:rPr lang="en-US" smtClean="0"/>
-              <a:t>1/23/2019</a:t>
+              <a:t>1/24/2019</a:t>
             </a:fld>
             <a:endParaRPr lang="en-US" dirty="0"/>
           </a:p>
@@ -667,7 +672,7 @@
           <a:p>
             <a:fld id="{5D63FE85-95CD-40DC-BFF3-BE62C2A435E5}" type="datetimeFigureOut">
               <a:rPr lang="en-US" smtClean="0"/>
-              <a:t>1/23/2019</a:t>
+              <a:t>1/24/2019</a:t>
             </a:fld>
             <a:endParaRPr lang="en-US" dirty="0"/>
           </a:p>
@@ -865,7 +870,7 @@
           <a:p>
             <a:fld id="{5D63FE85-95CD-40DC-BFF3-BE62C2A435E5}" type="datetimeFigureOut">
               <a:rPr lang="en-US" smtClean="0"/>
-              <a:t>1/23/2019</a:t>
+              <a:t>1/24/2019</a:t>
             </a:fld>
             <a:endParaRPr lang="en-US" dirty="0"/>
           </a:p>
@@ -1140,7 +1145,7 @@
           <a:p>
             <a:fld id="{5D63FE85-95CD-40DC-BFF3-BE62C2A435E5}" type="datetimeFigureOut">
               <a:rPr lang="en-US" smtClean="0"/>
-              <a:t>1/23/2019</a:t>
+              <a:t>1/24/2019</a:t>
             </a:fld>
             <a:endParaRPr lang="en-US" dirty="0"/>
           </a:p>
@@ -1405,7 +1410,7 @@
           <a:p>
             <a:fld id="{5D63FE85-95CD-40DC-BFF3-BE62C2A435E5}" type="datetimeFigureOut">
               <a:rPr lang="en-US" smtClean="0"/>
-              <a:t>1/23/2019</a:t>
+              <a:t>1/24/2019</a:t>
             </a:fld>
             <a:endParaRPr lang="en-US" dirty="0"/>
           </a:p>
@@ -1817,7 +1822,7 @@
           <a:p>
             <a:fld id="{5D63FE85-95CD-40DC-BFF3-BE62C2A435E5}" type="datetimeFigureOut">
               <a:rPr lang="en-US" smtClean="0"/>
-              <a:t>1/23/2019</a:t>
+              <a:t>1/24/2019</a:t>
             </a:fld>
             <a:endParaRPr lang="en-US" dirty="0"/>
           </a:p>
@@ -1958,7 +1963,7 @@
           <a:p>
             <a:fld id="{5D63FE85-95CD-40DC-BFF3-BE62C2A435E5}" type="datetimeFigureOut">
               <a:rPr lang="en-US" smtClean="0"/>
-              <a:t>1/23/2019</a:t>
+              <a:t>1/24/2019</a:t>
             </a:fld>
             <a:endParaRPr lang="en-US" dirty="0"/>
           </a:p>
@@ -2071,7 +2076,7 @@
           <a:p>
             <a:fld id="{5D63FE85-95CD-40DC-BFF3-BE62C2A435E5}" type="datetimeFigureOut">
               <a:rPr lang="en-US" smtClean="0"/>
-              <a:t>1/23/2019</a:t>
+              <a:t>1/24/2019</a:t>
             </a:fld>
             <a:endParaRPr lang="en-US" dirty="0"/>
           </a:p>
@@ -2382,7 +2387,7 @@
           <a:p>
             <a:fld id="{5D63FE85-95CD-40DC-BFF3-BE62C2A435E5}" type="datetimeFigureOut">
               <a:rPr lang="en-US" smtClean="0"/>
-              <a:t>1/23/2019</a:t>
+              <a:t>1/24/2019</a:t>
             </a:fld>
             <a:endParaRPr lang="en-US" dirty="0"/>
           </a:p>
@@ -2670,7 +2675,7 @@
           <a:p>
             <a:fld id="{5D63FE85-95CD-40DC-BFF3-BE62C2A435E5}" type="datetimeFigureOut">
               <a:rPr lang="en-US" smtClean="0"/>
-              <a:t>1/23/2019</a:t>
+              <a:t>1/24/2019</a:t>
             </a:fld>
             <a:endParaRPr lang="en-US" dirty="0"/>
           </a:p>
@@ -2911,7 +2916,7 @@
           <a:p>
             <a:fld id="{5D63FE85-95CD-40DC-BFF3-BE62C2A435E5}" type="datetimeFigureOut">
               <a:rPr lang="en-US" smtClean="0"/>
-              <a:t>1/23/2019</a:t>
+              <a:t>1/24/2019</a:t>
             </a:fld>
             <a:endParaRPr lang="en-US" dirty="0"/>
           </a:p>
@@ -4070,7 +4075,7 @@
           <a:p>
             <a:r>
               <a:rPr lang="en-US" dirty="0"/>
-              <a:t>One possibility for the higher home price growth in the this data set could be due to a lower supply of homes, with little to no change in demand. Further research is required. </a:t>
+              <a:t>One possibility for the higher home price growth in this data set could be due to a lower supply of homes, with little to no change in demand. Further research is required. </a:t>
             </a:r>
           </a:p>
         </p:txBody>

</xml_diff>

<commit_message>
LT slight mod to PPT
</commit_message>
<xml_diff>
--- a/Are Housing Prices Affected by Natural Disasters.pptx
+++ b/Are Housing Prices Affected by Natural Disasters.pptx
@@ -1044,7 +1044,7 @@
 <dgm:dataModel xmlns:dgm="http://schemas.openxmlformats.org/drawingml/2006/diagram" xmlns:a="http://schemas.openxmlformats.org/drawingml/2006/main">
   <dgm:ptLst>
     <dgm:pt modelId="{FDF78E5B-080A-40C9-BF30-C0C18E9C186A}" type="doc">
-      <dgm:prSet loTypeId="urn:microsoft.com/office/officeart/2016/7/layout/ChevronBlockProcess" loCatId="process" qsTypeId="urn:microsoft.com/office/officeart/2005/8/quickstyle/simple4" qsCatId="simple" csTypeId="urn:microsoft.com/office/officeart/2005/8/colors/colorful1" csCatId="colorful"/>
+      <dgm:prSet loTypeId="urn:microsoft.com/office/officeart/2016/7/layout/ChevronBlockProcess" loCatId="process" qsTypeId="urn:microsoft.com/office/officeart/2005/8/quickstyle/simple4" qsCatId="simple" csTypeId="urn:microsoft.com/office/officeart/2005/8/colors/colorful1" csCatId="colorful" phldr="1"/>
       <dgm:spPr/>
       <dgm:t>
         <a:bodyPr/>
@@ -1062,8 +1062,8 @@
         <a:lstStyle/>
         <a:p>
           <a:r>
-            <a:rPr lang="en-US"/>
-            <a:t>Mine and clean</a:t>
+            <a:rPr lang="en-US" dirty="0"/>
+            <a:t>Mine and Clean</a:t>
           </a:r>
         </a:p>
       </dgm:t>
@@ -1134,8 +1134,8 @@
         <a:lstStyle/>
         <a:p>
           <a:r>
-            <a:rPr lang="en-US"/>
-            <a:t>Create</a:t>
+            <a:rPr lang="en-US" dirty="0"/>
+            <a:t>Create Control</a:t>
           </a:r>
         </a:p>
       </dgm:t>
@@ -1170,7 +1170,7 @@
         <a:lstStyle/>
         <a:p>
           <a:r>
-            <a:rPr lang="en-US"/>
+            <a:rPr lang="en-US" dirty="0"/>
             <a:t>Create a control group by taking the population average for each month.</a:t>
           </a:r>
         </a:p>
@@ -1206,8 +1206,8 @@
         <a:lstStyle/>
         <a:p>
           <a:r>
-            <a:rPr lang="en-US"/>
-            <a:t>Merge</a:t>
+            <a:rPr lang="en-US" dirty="0"/>
+            <a:t>Merge Data</a:t>
           </a:r>
         </a:p>
       </dgm:t>
@@ -1278,8 +1278,8 @@
         <a:lstStyle/>
         <a:p>
           <a:r>
-            <a:rPr lang="en-US"/>
-            <a:t>Loop through</a:t>
+            <a:rPr lang="en-US" dirty="0"/>
+            <a:t>Loop Through</a:t>
           </a:r>
         </a:p>
       </dgm:t>
@@ -1350,8 +1350,8 @@
         <a:lstStyle/>
         <a:p>
           <a:r>
-            <a:rPr lang="en-US"/>
-            <a:t>Conduct</a:t>
+            <a:rPr lang="en-US" dirty="0"/>
+            <a:t>Conduct Test</a:t>
           </a:r>
         </a:p>
       </dgm:t>
@@ -1603,7 +1603,7 @@
       </dsp:nvSpPr>
       <dsp:spPr>
         <a:xfrm>
-          <a:off x="8879" y="773078"/>
+          <a:off x="8879" y="830897"/>
           <a:ext cx="2141589" cy="642476"/>
         </a:xfrm>
         <a:prstGeom prst="chevron">
@@ -1683,7 +1683,7 @@
         </a:bodyPr>
         <a:lstStyle/>
         <a:p>
-          <a:pPr marL="0" lvl="0" indent="0" algn="ctr" defTabSz="889000">
+          <a:pPr marL="0" lvl="0" indent="0" algn="ctr" defTabSz="844550">
             <a:lnSpc>
               <a:spcPct val="90000"/>
             </a:lnSpc>
@@ -1696,13 +1696,13 @@
             <a:buNone/>
           </a:pPr>
           <a:r>
-            <a:rPr lang="en-US" sz="2000" kern="1200"/>
-            <a:t>Mine and clean</a:t>
+            <a:rPr lang="en-US" sz="1900" kern="1200" dirty="0"/>
+            <a:t>Mine and Clean</a:t>
           </a:r>
         </a:p>
       </dsp:txBody>
       <dsp:txXfrm>
-        <a:off x="201622" y="773078"/>
+        <a:off x="201622" y="830897"/>
         <a:ext cx="1756103" cy="642476"/>
       </dsp:txXfrm>
     </dsp:sp>
@@ -1713,8 +1713,8 @@
       </dsp:nvSpPr>
       <dsp:spPr>
         <a:xfrm>
-          <a:off x="8879" y="1415555"/>
-          <a:ext cx="1948846" cy="1965854"/>
+          <a:off x="8879" y="1473374"/>
+          <a:ext cx="1948846" cy="1850215"/>
         </a:xfrm>
         <a:prstGeom prst="rect">
           <a:avLst/>
@@ -1763,7 +1763,7 @@
         </a:bodyPr>
         <a:lstStyle/>
         <a:p>
-          <a:pPr marL="0" lvl="0" indent="0" algn="l" defTabSz="666750">
+          <a:pPr marL="0" lvl="0" indent="0" algn="l" defTabSz="622300">
             <a:lnSpc>
               <a:spcPct val="90000"/>
             </a:lnSpc>
@@ -1776,14 +1776,14 @@
             <a:buNone/>
           </a:pPr>
           <a:r>
-            <a:rPr lang="en-US" sz="1500" kern="1200"/>
+            <a:rPr lang="en-US" sz="1400" kern="1200"/>
             <a:t>Mine and clean data from FEMA and Zillow</a:t>
           </a:r>
         </a:p>
       </dsp:txBody>
       <dsp:txXfrm>
-        <a:off x="8879" y="1415555"/>
-        <a:ext cx="1948846" cy="1965854"/>
+        <a:off x="8879" y="1473374"/>
+        <a:ext cx="1948846" cy="1850215"/>
       </dsp:txXfrm>
     </dsp:sp>
     <dsp:sp modelId="{26CF5FBA-32B6-46A9-9F0A-ED69207C9F21}">
@@ -1793,7 +1793,7 @@
       </dsp:nvSpPr>
       <dsp:spPr>
         <a:xfrm>
-          <a:off x="2097942" y="773078"/>
+          <a:off x="2097942" y="830897"/>
           <a:ext cx="2141589" cy="642476"/>
         </a:xfrm>
         <a:prstGeom prst="chevron">
@@ -1873,7 +1873,7 @@
         </a:bodyPr>
         <a:lstStyle/>
         <a:p>
-          <a:pPr marL="0" lvl="0" indent="0" algn="ctr" defTabSz="889000">
+          <a:pPr marL="0" lvl="0" indent="0" algn="ctr" defTabSz="844550">
             <a:lnSpc>
               <a:spcPct val="90000"/>
             </a:lnSpc>
@@ -1886,13 +1886,13 @@
             <a:buNone/>
           </a:pPr>
           <a:r>
-            <a:rPr lang="en-US" sz="2000" kern="1200"/>
-            <a:t>Create</a:t>
+            <a:rPr lang="en-US" sz="1900" kern="1200" dirty="0"/>
+            <a:t>Create Control</a:t>
           </a:r>
         </a:p>
       </dsp:txBody>
       <dsp:txXfrm>
-        <a:off x="2290685" y="773078"/>
+        <a:off x="2290685" y="830897"/>
         <a:ext cx="1756103" cy="642476"/>
       </dsp:txXfrm>
     </dsp:sp>
@@ -1903,8 +1903,8 @@
       </dsp:nvSpPr>
       <dsp:spPr>
         <a:xfrm>
-          <a:off x="2097942" y="1415555"/>
-          <a:ext cx="1948846" cy="1965854"/>
+          <a:off x="2097942" y="1473374"/>
+          <a:ext cx="1948846" cy="1850215"/>
         </a:xfrm>
         <a:prstGeom prst="rect">
           <a:avLst/>
@@ -1953,7 +1953,7 @@
         </a:bodyPr>
         <a:lstStyle/>
         <a:p>
-          <a:pPr marL="0" lvl="0" indent="0" algn="l" defTabSz="666750">
+          <a:pPr marL="0" lvl="0" indent="0" algn="l" defTabSz="622300">
             <a:lnSpc>
               <a:spcPct val="90000"/>
             </a:lnSpc>
@@ -1966,14 +1966,14 @@
             <a:buNone/>
           </a:pPr>
           <a:r>
-            <a:rPr lang="en-US" sz="1500" kern="1200"/>
+            <a:rPr lang="en-US" sz="1400" kern="1200" dirty="0"/>
             <a:t>Create a control group by taking the population average for each month.</a:t>
           </a:r>
         </a:p>
       </dsp:txBody>
       <dsp:txXfrm>
-        <a:off x="2097942" y="1415555"/>
-        <a:ext cx="1948846" cy="1965854"/>
+        <a:off x="2097942" y="1473374"/>
+        <a:ext cx="1948846" cy="1850215"/>
       </dsp:txXfrm>
     </dsp:sp>
     <dsp:sp modelId="{1B91FF8B-8EC3-4A6A-9C6B-9F02750B3C7C}">
@@ -1983,7 +1983,7 @@
       </dsp:nvSpPr>
       <dsp:spPr>
         <a:xfrm>
-          <a:off x="4187005" y="773078"/>
+          <a:off x="4187005" y="830897"/>
           <a:ext cx="2141589" cy="642476"/>
         </a:xfrm>
         <a:prstGeom prst="chevron">
@@ -2063,7 +2063,7 @@
         </a:bodyPr>
         <a:lstStyle/>
         <a:p>
-          <a:pPr marL="0" lvl="0" indent="0" algn="ctr" defTabSz="889000">
+          <a:pPr marL="0" lvl="0" indent="0" algn="ctr" defTabSz="844550">
             <a:lnSpc>
               <a:spcPct val="90000"/>
             </a:lnSpc>
@@ -2076,13 +2076,13 @@
             <a:buNone/>
           </a:pPr>
           <a:r>
-            <a:rPr lang="en-US" sz="2000" kern="1200"/>
-            <a:t>Merge</a:t>
+            <a:rPr lang="en-US" sz="1900" kern="1200" dirty="0"/>
+            <a:t>Merge Data</a:t>
           </a:r>
         </a:p>
       </dsp:txBody>
       <dsp:txXfrm>
-        <a:off x="4379748" y="773078"/>
+        <a:off x="4379748" y="830897"/>
         <a:ext cx="1756103" cy="642476"/>
       </dsp:txXfrm>
     </dsp:sp>
@@ -2093,8 +2093,8 @@
       </dsp:nvSpPr>
       <dsp:spPr>
         <a:xfrm>
-          <a:off x="4187005" y="1415555"/>
-          <a:ext cx="1948846" cy="1965854"/>
+          <a:off x="4187005" y="1473374"/>
+          <a:ext cx="1948846" cy="1850215"/>
         </a:xfrm>
         <a:prstGeom prst="rect">
           <a:avLst/>
@@ -2143,7 +2143,7 @@
         </a:bodyPr>
         <a:lstStyle/>
         <a:p>
-          <a:pPr marL="0" lvl="0" indent="0" algn="l" defTabSz="666750">
+          <a:pPr marL="0" lvl="0" indent="0" algn="l" defTabSz="622300">
             <a:lnSpc>
               <a:spcPct val="90000"/>
             </a:lnSpc>
@@ -2156,14 +2156,14 @@
             <a:buNone/>
           </a:pPr>
           <a:r>
-            <a:rPr lang="en-US" sz="1500" kern="1200"/>
+            <a:rPr lang="en-US" sz="1400" kern="1200"/>
             <a:t>Merge the FEMA and total Zillow data sets together based on County and State.</a:t>
           </a:r>
         </a:p>
       </dsp:txBody>
       <dsp:txXfrm>
-        <a:off x="4187005" y="1415555"/>
-        <a:ext cx="1948846" cy="1965854"/>
+        <a:off x="4187005" y="1473374"/>
+        <a:ext cx="1948846" cy="1850215"/>
       </dsp:txXfrm>
     </dsp:sp>
     <dsp:sp modelId="{E65B64E7-D04D-4E81-9AF5-0FC44DCC588C}">
@@ -2173,7 +2173,7 @@
       </dsp:nvSpPr>
       <dsp:spPr>
         <a:xfrm>
-          <a:off x="6276068" y="773078"/>
+          <a:off x="6276068" y="830897"/>
           <a:ext cx="2141589" cy="642476"/>
         </a:xfrm>
         <a:prstGeom prst="chevron">
@@ -2253,7 +2253,7 @@
         </a:bodyPr>
         <a:lstStyle/>
         <a:p>
-          <a:pPr marL="0" lvl="0" indent="0" algn="ctr" defTabSz="889000">
+          <a:pPr marL="0" lvl="0" indent="0" algn="ctr" defTabSz="844550">
             <a:lnSpc>
               <a:spcPct val="90000"/>
             </a:lnSpc>
@@ -2266,13 +2266,13 @@
             <a:buNone/>
           </a:pPr>
           <a:r>
-            <a:rPr lang="en-US" sz="2000" kern="1200"/>
-            <a:t>Loop through</a:t>
+            <a:rPr lang="en-US" sz="1900" kern="1200" dirty="0"/>
+            <a:t>Loop Through</a:t>
           </a:r>
         </a:p>
       </dsp:txBody>
       <dsp:txXfrm>
-        <a:off x="6468811" y="773078"/>
+        <a:off x="6468811" y="830897"/>
         <a:ext cx="1756103" cy="642476"/>
       </dsp:txXfrm>
     </dsp:sp>
@@ -2283,8 +2283,8 @@
       </dsp:nvSpPr>
       <dsp:spPr>
         <a:xfrm>
-          <a:off x="6276068" y="1415555"/>
-          <a:ext cx="1948846" cy="1965854"/>
+          <a:off x="6276068" y="1473374"/>
+          <a:ext cx="1948846" cy="1850215"/>
         </a:xfrm>
         <a:prstGeom prst="rect">
           <a:avLst/>
@@ -2333,7 +2333,7 @@
         </a:bodyPr>
         <a:lstStyle/>
         <a:p>
-          <a:pPr marL="0" lvl="0" indent="0" algn="l" defTabSz="666750">
+          <a:pPr marL="0" lvl="0" indent="0" algn="l" defTabSz="622300">
             <a:lnSpc>
               <a:spcPct val="90000"/>
             </a:lnSpc>
@@ -2346,14 +2346,14 @@
             <a:buNone/>
           </a:pPr>
           <a:r>
-            <a:rPr lang="en-US" sz="1500" kern="1200"/>
+            <a:rPr lang="en-US" sz="1400" kern="1200"/>
             <a:t>Loop through the data set to find 6 months returns for each zip code affected by an event, as well as for the control group. </a:t>
           </a:r>
         </a:p>
       </dsp:txBody>
       <dsp:txXfrm>
-        <a:off x="6276068" y="1415555"/>
-        <a:ext cx="1948846" cy="1965854"/>
+        <a:off x="6276068" y="1473374"/>
+        <a:ext cx="1948846" cy="1850215"/>
       </dsp:txXfrm>
     </dsp:sp>
     <dsp:sp modelId="{70BA5F09-8C09-4C24-A9DF-E75F82B54176}">
@@ -2363,7 +2363,7 @@
       </dsp:nvSpPr>
       <dsp:spPr>
         <a:xfrm>
-          <a:off x="8365131" y="773078"/>
+          <a:off x="8365131" y="830897"/>
           <a:ext cx="2141589" cy="642476"/>
         </a:xfrm>
         <a:prstGeom prst="chevron">
@@ -2443,7 +2443,7 @@
         </a:bodyPr>
         <a:lstStyle/>
         <a:p>
-          <a:pPr marL="0" lvl="0" indent="0" algn="ctr" defTabSz="889000">
+          <a:pPr marL="0" lvl="0" indent="0" algn="ctr" defTabSz="844550">
             <a:lnSpc>
               <a:spcPct val="90000"/>
             </a:lnSpc>
@@ -2456,13 +2456,13 @@
             <a:buNone/>
           </a:pPr>
           <a:r>
-            <a:rPr lang="en-US" sz="2000" kern="1200"/>
-            <a:t>Conduct</a:t>
+            <a:rPr lang="en-US" sz="1900" kern="1200" dirty="0"/>
+            <a:t>Conduct Test</a:t>
           </a:r>
         </a:p>
       </dsp:txBody>
       <dsp:txXfrm>
-        <a:off x="8557874" y="773078"/>
+        <a:off x="8557874" y="830897"/>
         <a:ext cx="1756103" cy="642476"/>
       </dsp:txXfrm>
     </dsp:sp>
@@ -2473,8 +2473,8 @@
       </dsp:nvSpPr>
       <dsp:spPr>
         <a:xfrm>
-          <a:off x="8365131" y="1415555"/>
-          <a:ext cx="1948846" cy="1965854"/>
+          <a:off x="8365131" y="1473374"/>
+          <a:ext cx="1948846" cy="1850215"/>
         </a:xfrm>
         <a:prstGeom prst="rect">
           <a:avLst/>
@@ -2523,7 +2523,7 @@
         </a:bodyPr>
         <a:lstStyle/>
         <a:p>
-          <a:pPr marL="0" lvl="0" indent="0" algn="l" defTabSz="666750">
+          <a:pPr marL="0" lvl="0" indent="0" algn="l" defTabSz="622300">
             <a:lnSpc>
               <a:spcPct val="90000"/>
             </a:lnSpc>
@@ -2536,14 +2536,14 @@
             <a:buNone/>
           </a:pPr>
           <a:r>
-            <a:rPr lang="en-US" sz="1500" kern="1200"/>
+            <a:rPr lang="en-US" sz="1400" kern="1200"/>
             <a:t>Conduct Moods Median test to find if we were able to “prove” a positive or negative effect. </a:t>
           </a:r>
         </a:p>
       </dsp:txBody>
       <dsp:txXfrm>
-        <a:off x="8365131" y="1415555"/>
-        <a:ext cx="1948846" cy="1965854"/>
+        <a:off x="8365131" y="1473374"/>
+        <a:ext cx="1948846" cy="1850215"/>
       </dsp:txXfrm>
     </dsp:sp>
   </dsp:spTree>
@@ -8519,7 +8519,7 @@
             <p:ph idx="1"/>
             <p:extLst>
               <p:ext uri="{D42A27DB-BD31-4B8C-83A1-F6EECF244321}">
-                <p14:modId xmlns:p14="http://schemas.microsoft.com/office/powerpoint/2010/main" val="2591957861"/>
+                <p14:modId xmlns:p14="http://schemas.microsoft.com/office/powerpoint/2010/main" val="4115603778"/>
               </p:ext>
             </p:extLst>
           </p:nvPr>

</xml_diff>